<commit_message>
STARTED - task 9: Implementação do Tangram. http://code.google.com/p/soundwave/issues/detail?id=9
</commit_message>
<xml_diff>
--- a/docs/tcc/Implementação de Suporta à Programação e Interpretação da.pptx
+++ b/docs/tcc/Implementação de Suporta à Programação e Interpretação da.pptx
@@ -9,9 +9,17 @@
     <p:sldId id="257" r:id="rId3"/>
     <p:sldId id="258" r:id="rId4"/>
     <p:sldId id="259" r:id="rId5"/>
-    <p:sldId id="260" r:id="rId6"/>
-    <p:sldId id="261" r:id="rId7"/>
-    <p:sldId id="262" r:id="rId8"/>
+    <p:sldId id="263" r:id="rId6"/>
+    <p:sldId id="264" r:id="rId7"/>
+    <p:sldId id="266" r:id="rId8"/>
+    <p:sldId id="268" r:id="rId9"/>
+    <p:sldId id="269" r:id="rId10"/>
+    <p:sldId id="270" r:id="rId11"/>
+    <p:sldId id="260" r:id="rId12"/>
+    <p:sldId id="265" r:id="rId13"/>
+    <p:sldId id="267" r:id="rId14"/>
+    <p:sldId id="261" r:id="rId15"/>
+    <p:sldId id="262" r:id="rId16"/>
   </p:sldIdLst>
   <p:sldSz cx="9144000" cy="6858000" type="screen4x3"/>
   <p:notesSz cx="6858000" cy="9144000"/>
@@ -248,7 +256,7 @@
             <a:fld id="{54AB02A5-4FE5-49D9-9E24-09F23B90C450}" type="datetimeFigureOut">
               <a:rPr lang="en-US" smtClean="0"/>
               <a:pPr/>
-              <a:t>6/27/2010</a:t>
+              <a:t>6/28/2010</a:t>
             </a:fld>
             <a:endParaRPr lang="en-US"/>
           </a:p>
@@ -563,7 +571,7 @@
             <a:fld id="{54AB02A5-4FE5-49D9-9E24-09F23B90C450}" type="datetimeFigureOut">
               <a:rPr lang="en-US" smtClean="0"/>
               <a:pPr/>
-              <a:t>6/27/2010</a:t>
+              <a:t>6/28/2010</a:t>
             </a:fld>
             <a:endParaRPr lang="en-US"/>
           </a:p>
@@ -750,7 +758,7 @@
             <a:fld id="{54AB02A5-4FE5-49D9-9E24-09F23B90C450}" type="datetimeFigureOut">
               <a:rPr lang="en-US" smtClean="0"/>
               <a:pPr/>
-              <a:t>6/27/2010</a:t>
+              <a:t>6/28/2010</a:t>
             </a:fld>
             <a:endParaRPr lang="en-US"/>
           </a:p>
@@ -927,7 +935,7 @@
             <a:fld id="{54AB02A5-4FE5-49D9-9E24-09F23B90C450}" type="datetimeFigureOut">
               <a:rPr lang="en-US" smtClean="0"/>
               <a:pPr/>
-              <a:t>6/27/2010</a:t>
+              <a:t>6/28/2010</a:t>
             </a:fld>
             <a:endParaRPr lang="en-US"/>
           </a:p>
@@ -1197,7 +1205,7 @@
             <a:fld id="{54AB02A5-4FE5-49D9-9E24-09F23B90C450}" type="datetimeFigureOut">
               <a:rPr lang="en-US" smtClean="0"/>
               <a:pPr/>
-              <a:t>6/27/2010</a:t>
+              <a:t>6/28/2010</a:t>
             </a:fld>
             <a:endParaRPr lang="en-US"/>
           </a:p>
@@ -1667,7 +1675,7 @@
             <a:fld id="{54AB02A5-4FE5-49D9-9E24-09F23B90C450}" type="datetimeFigureOut">
               <a:rPr lang="en-US" smtClean="0"/>
               <a:pPr/>
-              <a:t>6/27/2010</a:t>
+              <a:t>6/28/2010</a:t>
             </a:fld>
             <a:endParaRPr lang="en-US"/>
           </a:p>
@@ -2158,7 +2166,7 @@
             <a:fld id="{54AB02A5-4FE5-49D9-9E24-09F23B90C450}" type="datetimeFigureOut">
               <a:rPr lang="en-US" smtClean="0"/>
               <a:pPr/>
-              <a:t>6/27/2010</a:t>
+              <a:t>6/28/2010</a:t>
             </a:fld>
             <a:endParaRPr lang="en-US"/>
           </a:p>
@@ -2286,7 +2294,7 @@
             <a:fld id="{54AB02A5-4FE5-49D9-9E24-09F23B90C450}" type="datetimeFigureOut">
               <a:rPr lang="en-US" smtClean="0"/>
               <a:pPr/>
-              <a:t>6/27/2010</a:t>
+              <a:t>6/28/2010</a:t>
             </a:fld>
             <a:endParaRPr lang="en-US"/>
           </a:p>
@@ -2432,7 +2440,7 @@
             <a:fld id="{54AB02A5-4FE5-49D9-9E24-09F23B90C450}" type="datetimeFigureOut">
               <a:rPr lang="en-US" smtClean="0"/>
               <a:pPr/>
-              <a:t>6/27/2010</a:t>
+              <a:t>6/28/2010</a:t>
             </a:fld>
             <a:endParaRPr lang="en-US"/>
           </a:p>
@@ -2756,7 +2764,7 @@
             <a:fld id="{54AB02A5-4FE5-49D9-9E24-09F23B90C450}" type="datetimeFigureOut">
               <a:rPr lang="en-US" smtClean="0"/>
               <a:pPr/>
-              <a:t>6/27/2010</a:t>
+              <a:t>6/28/2010</a:t>
             </a:fld>
             <a:endParaRPr lang="en-US"/>
           </a:p>
@@ -2892,7 +2900,7 @@
             <a:fld id="{54AB02A5-4FE5-49D9-9E24-09F23B90C450}" type="datetimeFigureOut">
               <a:rPr lang="en-US" smtClean="0"/>
               <a:pPr/>
-              <a:t>6/27/2010</a:t>
+              <a:t>6/28/2010</a:t>
             </a:fld>
             <a:endParaRPr lang="en-US"/>
           </a:p>
@@ -3676,7 +3684,7 @@
             <a:fld id="{54AB02A5-4FE5-49D9-9E24-09F23B90C450}" type="datetimeFigureOut">
               <a:rPr lang="en-US" smtClean="0"/>
               <a:pPr algn="r" eaLnBrk="1" latinLnBrk="0" hangingPunct="1"/>
-              <a:t>6/27/2010</a:t>
+              <a:t>6/28/2010</a:t>
             </a:fld>
             <a:endParaRPr lang="en-US" sz="1200">
               <a:solidFill>
@@ -4241,18 +4249,9 @@
           <a:p>
             <a:pPr algn="ctr"/>
             <a:r>
-              <a:rPr lang="pt-BR" dirty="0" err="1" smtClean="0"/>
-              <a:t>Wendel</a:t>
-            </a:r>
-            <a:r>
               <a:rPr lang="pt-BR" dirty="0" smtClean="0"/>
-              <a:t> David </a:t>
-            </a:r>
-            <a:r>
-              <a:rPr lang="pt-BR" dirty="0" err="1" smtClean="0"/>
-              <a:t>Przygoda</a:t>
-            </a:r>
-            <a:endParaRPr lang="pt-BR" dirty="0" smtClean="0"/>
+              <a:t>Wendel David Przygoda</a:t>
+            </a:r>
           </a:p>
           <a:p>
             <a:pPr algn="ctr"/>
@@ -4269,6 +4268,964 @@
   <p:clrMapOvr>
     <a:masterClrMapping/>
   </p:clrMapOvr>
+  <p:timing>
+    <p:tnLst>
+      <p:par>
+        <p:cTn id="1" dur="indefinite" restart="never" nodeType="tmRoot"/>
+      </p:par>
+    </p:tnLst>
+  </p:timing>
+</p:sld>
+</file>
+
+<file path=ppt/slides/slide10.xml><?xml version="1.0" encoding="utf-8"?>
+<p:sld xmlns:a="http://schemas.openxmlformats.org/drawingml/2006/main" xmlns:r="http://schemas.openxmlformats.org/officeDocument/2006/relationships" xmlns:p="http://schemas.openxmlformats.org/presentationml/2006/main">
+  <p:cSld>
+    <p:spTree>
+      <p:nvGrpSpPr>
+        <p:cNvPr id="1" name=""/>
+        <p:cNvGrpSpPr/>
+        <p:nvPr/>
+      </p:nvGrpSpPr>
+      <p:grpSpPr>
+        <a:xfrm>
+          <a:off x="0" y="0"/>
+          <a:ext cx="0" cy="0"/>
+          <a:chOff x="0" y="0"/>
+          <a:chExt cx="0" cy="0"/>
+        </a:xfrm>
+      </p:grpSpPr>
+      <p:sp>
+        <p:nvSpPr>
+          <p:cNvPr id="2" name="Título 1"/>
+          <p:cNvSpPr>
+            <a:spLocks noGrp="1"/>
+          </p:cNvSpPr>
+          <p:nvPr>
+            <p:ph type="title"/>
+          </p:nvPr>
+        </p:nvSpPr>
+        <p:spPr/>
+        <p:txBody>
+          <a:bodyPr/>
+          <a:lstStyle/>
+          <a:p>
+            <a:r>
+              <a:rPr lang="pt-BR" dirty="0" smtClean="0"/>
+              <a:t>Desenvolvimento</a:t>
+            </a:r>
+            <a:endParaRPr lang="pt-BR" dirty="0"/>
+          </a:p>
+        </p:txBody>
+      </p:sp>
+      <p:sp>
+        <p:nvSpPr>
+          <p:cNvPr id="3" name="Espaço Reservado para Conteúdo 2"/>
+          <p:cNvSpPr>
+            <a:spLocks noGrp="1"/>
+          </p:cNvSpPr>
+          <p:nvPr>
+            <p:ph idx="1"/>
+          </p:nvPr>
+        </p:nvSpPr>
+        <p:spPr>
+          <a:xfrm>
+            <a:off x="1435608" y="1447800"/>
+            <a:ext cx="7498080" cy="5195910"/>
+          </a:xfrm>
+        </p:spPr>
+        <p:txBody>
+          <a:bodyPr/>
+          <a:lstStyle/>
+          <a:p>
+            <a:pPr>
+              <a:buNone/>
+            </a:pPr>
+            <a:r>
+              <a:rPr lang="pt-BR" sz="2200" dirty="0" smtClean="0">
+                <a:latin typeface="Courier New" pitchFamily="49" charset="0"/>
+                <a:cs typeface="Courier New" pitchFamily="49" charset="0"/>
+              </a:rPr>
+              <a:t>fala (</a:t>
+            </a:r>
+            <a:r>
+              <a:rPr lang="pt-BR" sz="2200" dirty="0" smtClean="0">
+                <a:solidFill>
+                  <a:srgbClr val="0070C0"/>
+                </a:solidFill>
+                <a:latin typeface="Courier New" pitchFamily="49" charset="0"/>
+                <a:cs typeface="Courier New" pitchFamily="49" charset="0"/>
+              </a:rPr>
+              <a:t>‘/home/</a:t>
+            </a:r>
+            <a:r>
+              <a:rPr lang="pt-BR" sz="2200" dirty="0" err="1" smtClean="0">
+                <a:solidFill>
+                  <a:srgbClr val="0070C0"/>
+                </a:solidFill>
+                <a:latin typeface="Courier New" pitchFamily="49" charset="0"/>
+                <a:cs typeface="Courier New" pitchFamily="49" charset="0"/>
+              </a:rPr>
+              <a:t>furb</a:t>
+            </a:r>
+            <a:r>
+              <a:rPr lang="pt-BR" sz="2200" dirty="0" smtClean="0">
+                <a:solidFill>
+                  <a:srgbClr val="0070C0"/>
+                </a:solidFill>
+                <a:latin typeface="Courier New" pitchFamily="49" charset="0"/>
+                <a:cs typeface="Courier New" pitchFamily="49" charset="0"/>
+              </a:rPr>
+              <a:t>/voz1.jsml’</a:t>
+            </a:r>
+            <a:r>
+              <a:rPr lang="pt-BR" sz="2200" dirty="0" smtClean="0">
+                <a:latin typeface="Courier New" pitchFamily="49" charset="0"/>
+                <a:cs typeface="Courier New" pitchFamily="49" charset="0"/>
+              </a:rPr>
+              <a:t>)</a:t>
+            </a:r>
+          </a:p>
+          <a:p>
+            <a:pPr>
+              <a:buNone/>
+            </a:pPr>
+            <a:r>
+              <a:rPr lang="pt-BR" sz="2200" dirty="0" smtClean="0">
+                <a:latin typeface="Courier New" pitchFamily="49" charset="0"/>
+                <a:cs typeface="Courier New" pitchFamily="49" charset="0"/>
+              </a:rPr>
+              <a:t>fala (</a:t>
+            </a:r>
+            <a:r>
+              <a:rPr lang="pt-BR" sz="2200" dirty="0" smtClean="0">
+                <a:solidFill>
+                  <a:srgbClr val="0070C0"/>
+                </a:solidFill>
+                <a:latin typeface="Courier New" pitchFamily="49" charset="0"/>
+                <a:cs typeface="Courier New" pitchFamily="49" charset="0"/>
+              </a:rPr>
+              <a:t>‘/home/</a:t>
+            </a:r>
+            <a:r>
+              <a:rPr lang="pt-BR" sz="2200" dirty="0" err="1" smtClean="0">
+                <a:solidFill>
+                  <a:srgbClr val="0070C0"/>
+                </a:solidFill>
+                <a:latin typeface="Courier New" pitchFamily="49" charset="0"/>
+                <a:cs typeface="Courier New" pitchFamily="49" charset="0"/>
+              </a:rPr>
+              <a:t>furb</a:t>
+            </a:r>
+            <a:r>
+              <a:rPr lang="pt-BR" sz="2200" dirty="0" smtClean="0">
+                <a:solidFill>
+                  <a:srgbClr val="0070C0"/>
+                </a:solidFill>
+                <a:latin typeface="Courier New" pitchFamily="49" charset="0"/>
+                <a:cs typeface="Courier New" pitchFamily="49" charset="0"/>
+              </a:rPr>
+              <a:t>/voz2.jsml’</a:t>
+            </a:r>
+            <a:r>
+              <a:rPr lang="pt-BR" sz="2200" dirty="0" smtClean="0">
+                <a:solidFill>
+                  <a:srgbClr val="0070C0"/>
+                </a:solidFill>
+                <a:latin typeface="Courier New" pitchFamily="49" charset="0"/>
+                <a:cs typeface="Courier New" pitchFamily="49" charset="0"/>
+              </a:rPr>
+              <a:t> </a:t>
+            </a:r>
+            <a:r>
+              <a:rPr lang="pt-BR" sz="2200" dirty="0" smtClean="0">
+                <a:latin typeface="Courier New" pitchFamily="49" charset="0"/>
+                <a:cs typeface="Courier New" pitchFamily="49" charset="0"/>
+              </a:rPr>
+              <a:t>sobreposta)</a:t>
+            </a:r>
+          </a:p>
+          <a:p>
+            <a:pPr>
+              <a:buNone/>
+            </a:pPr>
+            <a:r>
+              <a:rPr lang="pt-BR" sz="2200" dirty="0" smtClean="0">
+                <a:latin typeface="Courier New" pitchFamily="49" charset="0"/>
+                <a:cs typeface="Courier New" pitchFamily="49" charset="0"/>
+              </a:rPr>
+              <a:t>fala (</a:t>
+            </a:r>
+            <a:r>
+              <a:rPr lang="pt-BR" sz="2200" dirty="0" smtClean="0">
+                <a:solidFill>
+                  <a:srgbClr val="0070C0"/>
+                </a:solidFill>
+                <a:latin typeface="Courier New" pitchFamily="49" charset="0"/>
+                <a:cs typeface="Courier New" pitchFamily="49" charset="0"/>
+              </a:rPr>
+              <a:t>‘/home/</a:t>
+            </a:r>
+            <a:r>
+              <a:rPr lang="pt-BR" sz="2200" dirty="0" err="1" smtClean="0">
+                <a:solidFill>
+                  <a:srgbClr val="0070C0"/>
+                </a:solidFill>
+                <a:latin typeface="Courier New" pitchFamily="49" charset="0"/>
+                <a:cs typeface="Courier New" pitchFamily="49" charset="0"/>
+              </a:rPr>
+              <a:t>furb</a:t>
+            </a:r>
+            <a:r>
+              <a:rPr lang="pt-BR" sz="2200" dirty="0" smtClean="0">
+                <a:solidFill>
+                  <a:srgbClr val="0070C0"/>
+                </a:solidFill>
+                <a:latin typeface="Courier New" pitchFamily="49" charset="0"/>
+                <a:cs typeface="Courier New" pitchFamily="49" charset="0"/>
+              </a:rPr>
+              <a:t>/voz3.jsml’</a:t>
+            </a:r>
+            <a:r>
+              <a:rPr lang="pt-BR" sz="2200" dirty="0" smtClean="0">
+                <a:latin typeface="Courier New" pitchFamily="49" charset="0"/>
+                <a:cs typeface="Courier New" pitchFamily="49" charset="0"/>
+              </a:rPr>
+              <a:t> sobreposta)</a:t>
+            </a:r>
+            <a:endParaRPr lang="pt-BR" sz="2200" dirty="0" smtClean="0">
+              <a:latin typeface="Courier New" pitchFamily="49" charset="0"/>
+              <a:cs typeface="Courier New" pitchFamily="49" charset="0"/>
+            </a:endParaRPr>
+          </a:p>
+          <a:p>
+            <a:pPr>
+              <a:buNone/>
+            </a:pPr>
+            <a:r>
+              <a:rPr lang="pt-BR" sz="2200" dirty="0" smtClean="0">
+                <a:latin typeface="Courier New" pitchFamily="49" charset="0"/>
+                <a:cs typeface="Courier New" pitchFamily="49" charset="0"/>
+              </a:rPr>
+              <a:t>e</a:t>
+            </a:r>
+            <a:r>
+              <a:rPr lang="pt-BR" sz="2200" dirty="0" smtClean="0">
+                <a:latin typeface="Courier New" pitchFamily="49" charset="0"/>
+                <a:cs typeface="Courier New" pitchFamily="49" charset="0"/>
+              </a:rPr>
+              <a:t>nquanto fala inicio</a:t>
+            </a:r>
+          </a:p>
+          <a:p>
+            <a:pPr>
+              <a:buNone/>
+            </a:pPr>
+            <a:r>
+              <a:rPr lang="pt-BR" sz="2200" dirty="0" smtClean="0">
+                <a:latin typeface="Courier New" pitchFamily="49" charset="0"/>
+                <a:cs typeface="Courier New" pitchFamily="49" charset="0"/>
+              </a:rPr>
+              <a:t>	&lt;loop de animação&gt;</a:t>
+            </a:r>
+          </a:p>
+          <a:p>
+            <a:pPr>
+              <a:buNone/>
+            </a:pPr>
+            <a:endParaRPr lang="pt-BR" sz="2200" dirty="0" smtClean="0">
+              <a:latin typeface="Courier New" pitchFamily="49" charset="0"/>
+              <a:cs typeface="Courier New" pitchFamily="49" charset="0"/>
+            </a:endParaRPr>
+          </a:p>
+          <a:p>
+            <a:pPr>
+              <a:buNone/>
+            </a:pPr>
+            <a:endParaRPr lang="pt-BR" sz="2200" dirty="0" smtClean="0">
+              <a:latin typeface="Courier New" pitchFamily="49" charset="0"/>
+              <a:cs typeface="Courier New" pitchFamily="49" charset="0"/>
+            </a:endParaRPr>
+          </a:p>
+          <a:p>
+            <a:pPr>
+              <a:buNone/>
+            </a:pPr>
+            <a:endParaRPr lang="pt-BR" sz="2200" dirty="0" smtClean="0">
+              <a:latin typeface="Courier New" pitchFamily="49" charset="0"/>
+              <a:cs typeface="Courier New" pitchFamily="49" charset="0"/>
+            </a:endParaRPr>
+          </a:p>
+          <a:p>
+            <a:pPr>
+              <a:buNone/>
+            </a:pPr>
+            <a:endParaRPr lang="pt-BR" sz="2200" dirty="0" smtClean="0">
+              <a:latin typeface="Courier New" pitchFamily="49" charset="0"/>
+              <a:cs typeface="Courier New" pitchFamily="49" charset="0"/>
+            </a:endParaRPr>
+          </a:p>
+          <a:p>
+            <a:pPr>
+              <a:buNone/>
+            </a:pPr>
+            <a:r>
+              <a:rPr lang="pt-BR" sz="2200" dirty="0" smtClean="0">
+                <a:latin typeface="Courier New" pitchFamily="49" charset="0"/>
+                <a:cs typeface="Courier New" pitchFamily="49" charset="0"/>
+              </a:rPr>
+              <a:t>fim</a:t>
+            </a:r>
+          </a:p>
+          <a:p>
+            <a:pPr>
+              <a:buNone/>
+            </a:pPr>
+            <a:r>
+              <a:rPr lang="pt-BR" sz="2200" dirty="0" smtClean="0">
+                <a:latin typeface="Courier New" pitchFamily="49" charset="0"/>
+                <a:cs typeface="Courier New" pitchFamily="49" charset="0"/>
+              </a:rPr>
+              <a:t>fala (</a:t>
+            </a:r>
+            <a:r>
+              <a:rPr lang="pt-BR" sz="2200" dirty="0" smtClean="0">
+                <a:solidFill>
+                  <a:srgbClr val="0070C0"/>
+                </a:solidFill>
+                <a:latin typeface="Courier New" pitchFamily="49" charset="0"/>
+                <a:cs typeface="Courier New" pitchFamily="49" charset="0"/>
+              </a:rPr>
+              <a:t>‘/home/</a:t>
+            </a:r>
+            <a:r>
+              <a:rPr lang="pt-BR" sz="2200" dirty="0" err="1" smtClean="0">
+                <a:solidFill>
+                  <a:srgbClr val="0070C0"/>
+                </a:solidFill>
+                <a:latin typeface="Courier New" pitchFamily="49" charset="0"/>
+                <a:cs typeface="Courier New" pitchFamily="49" charset="0"/>
+              </a:rPr>
+              <a:t>furb</a:t>
+            </a:r>
+            <a:r>
+              <a:rPr lang="pt-BR" sz="2200" dirty="0" smtClean="0">
+                <a:solidFill>
+                  <a:srgbClr val="0070C0"/>
+                </a:solidFill>
+                <a:latin typeface="Courier New" pitchFamily="49" charset="0"/>
+                <a:cs typeface="Courier New" pitchFamily="49" charset="0"/>
+              </a:rPr>
+              <a:t>/voz4.jsml’</a:t>
+            </a:r>
+            <a:r>
+              <a:rPr lang="pt-BR" sz="2200" dirty="0" smtClean="0">
+                <a:latin typeface="Courier New" pitchFamily="49" charset="0"/>
+                <a:cs typeface="Courier New" pitchFamily="49" charset="0"/>
+              </a:rPr>
+              <a:t>)</a:t>
+            </a:r>
+          </a:p>
+          <a:p>
+            <a:pPr>
+              <a:buNone/>
+            </a:pPr>
+            <a:r>
+              <a:rPr lang="pt-BR" sz="2200" dirty="0" smtClean="0">
+                <a:latin typeface="Courier New" pitchFamily="49" charset="0"/>
+                <a:cs typeface="Courier New" pitchFamily="49" charset="0"/>
+              </a:rPr>
+              <a:t>e</a:t>
+            </a:r>
+            <a:r>
+              <a:rPr lang="pt-BR" sz="2200" dirty="0" smtClean="0">
+                <a:latin typeface="Courier New" pitchFamily="49" charset="0"/>
+                <a:cs typeface="Courier New" pitchFamily="49" charset="0"/>
+              </a:rPr>
+              <a:t>spera fala</a:t>
+            </a:r>
+          </a:p>
+          <a:p>
+            <a:pPr>
+              <a:buNone/>
+            </a:pPr>
+            <a:endParaRPr lang="pt-BR" dirty="0"/>
+          </a:p>
+        </p:txBody>
+      </p:sp>
+      <p:pic>
+        <p:nvPicPr>
+          <p:cNvPr id="4100" name="Picture 4" descr="C:\Documents and Settings\wendel\Desktop\untitled.JPG"/>
+          <p:cNvPicPr>
+            <a:picLocks noChangeAspect="1" noChangeArrowheads="1"/>
+          </p:cNvPicPr>
+          <p:nvPr/>
+        </p:nvPicPr>
+        <p:blipFill>
+          <a:blip r:embed="rId2"/>
+          <a:srcRect/>
+          <a:stretch>
+            <a:fillRect/>
+          </a:stretch>
+        </p:blipFill>
+        <p:spPr bwMode="auto">
+          <a:xfrm>
+            <a:off x="1714480" y="3500438"/>
+            <a:ext cx="3762375" cy="1590675"/>
+          </a:xfrm>
+          <a:prstGeom prst="rect">
+            <a:avLst/>
+          </a:prstGeom>
+          <a:noFill/>
+        </p:spPr>
+      </p:pic>
+    </p:spTree>
+  </p:cSld>
+  <p:clrMapOvr>
+    <a:masterClrMapping/>
+  </p:clrMapOvr>
+  <p:timing>
+    <p:tnLst>
+      <p:par>
+        <p:cTn id="1" dur="indefinite" restart="never" nodeType="tmRoot"/>
+      </p:par>
+    </p:tnLst>
+  </p:timing>
+</p:sld>
+</file>
+
+<file path=ppt/slides/slide11.xml><?xml version="1.0" encoding="utf-8"?>
+<p:sld xmlns:a="http://schemas.openxmlformats.org/drawingml/2006/main" xmlns:r="http://schemas.openxmlformats.org/officeDocument/2006/relationships" xmlns:p="http://schemas.openxmlformats.org/presentationml/2006/main">
+  <p:cSld>
+    <p:spTree>
+      <p:nvGrpSpPr>
+        <p:cNvPr id="1" name=""/>
+        <p:cNvGrpSpPr/>
+        <p:nvPr/>
+      </p:nvGrpSpPr>
+      <p:grpSpPr>
+        <a:xfrm>
+          <a:off x="0" y="0"/>
+          <a:ext cx="0" cy="0"/>
+          <a:chOff x="0" y="0"/>
+          <a:chExt cx="0" cy="0"/>
+        </a:xfrm>
+      </p:grpSpPr>
+      <p:sp>
+        <p:nvSpPr>
+          <p:cNvPr id="2" name="Título 1"/>
+          <p:cNvSpPr>
+            <a:spLocks noGrp="1"/>
+          </p:cNvSpPr>
+          <p:nvPr>
+            <p:ph type="title"/>
+          </p:nvPr>
+        </p:nvSpPr>
+        <p:spPr/>
+        <p:txBody>
+          <a:bodyPr/>
+          <a:lstStyle/>
+          <a:p>
+            <a:r>
+              <a:rPr lang="pt-BR" dirty="0" smtClean="0"/>
+              <a:t>Desenvolvimento</a:t>
+            </a:r>
+            <a:endParaRPr lang="pt-BR" dirty="0"/>
+          </a:p>
+        </p:txBody>
+      </p:sp>
+      <p:sp>
+        <p:nvSpPr>
+          <p:cNvPr id="3" name="Espaço Reservado para Conteúdo 2"/>
+          <p:cNvSpPr>
+            <a:spLocks noGrp="1"/>
+          </p:cNvSpPr>
+          <p:nvPr>
+            <p:ph idx="1"/>
+          </p:nvPr>
+        </p:nvSpPr>
+        <p:spPr>
+          <a:xfrm>
+            <a:off x="1435608" y="1447800"/>
+            <a:ext cx="7498080" cy="695316"/>
+          </a:xfrm>
+        </p:spPr>
+        <p:txBody>
+          <a:bodyPr/>
+          <a:lstStyle/>
+          <a:p>
+            <a:r>
+              <a:rPr lang="pt-BR" dirty="0" smtClean="0"/>
+              <a:t>Especificação</a:t>
+            </a:r>
+          </a:p>
+        </p:txBody>
+      </p:sp>
+      <p:pic>
+        <p:nvPicPr>
+          <p:cNvPr id="1027" name="Picture 3" descr="UC01"/>
+          <p:cNvPicPr>
+            <a:picLocks noChangeAspect="1" noChangeArrowheads="1"/>
+          </p:cNvPicPr>
+          <p:nvPr/>
+        </p:nvPicPr>
+        <p:blipFill>
+          <a:blip r:embed="rId2"/>
+          <a:srcRect/>
+          <a:stretch>
+            <a:fillRect/>
+          </a:stretch>
+        </p:blipFill>
+        <p:spPr bwMode="auto">
+          <a:xfrm>
+            <a:off x="1285852" y="2071678"/>
+            <a:ext cx="4495800" cy="3219450"/>
+          </a:xfrm>
+          <a:prstGeom prst="rect">
+            <a:avLst/>
+          </a:prstGeom>
+          <a:noFill/>
+          <a:ln w="9525">
+            <a:noFill/>
+            <a:miter lim="800000"/>
+            <a:headEnd/>
+            <a:tailEnd/>
+          </a:ln>
+        </p:spPr>
+      </p:pic>
+      <p:pic>
+        <p:nvPicPr>
+          <p:cNvPr id="8" name="Picture 3" descr="UC02"/>
+          <p:cNvPicPr>
+            <a:picLocks noChangeAspect="1" noChangeArrowheads="1"/>
+          </p:cNvPicPr>
+          <p:nvPr/>
+        </p:nvPicPr>
+        <p:blipFill>
+          <a:blip r:embed="rId3"/>
+          <a:srcRect/>
+          <a:stretch>
+            <a:fillRect/>
+          </a:stretch>
+        </p:blipFill>
+        <p:spPr bwMode="auto">
+          <a:xfrm>
+            <a:off x="5143504" y="4429132"/>
+            <a:ext cx="3352800" cy="2000250"/>
+          </a:xfrm>
+          <a:prstGeom prst="rect">
+            <a:avLst/>
+          </a:prstGeom>
+          <a:noFill/>
+          <a:ln w="9525">
+            <a:noFill/>
+            <a:miter lim="800000"/>
+            <a:headEnd/>
+            <a:tailEnd/>
+          </a:ln>
+        </p:spPr>
+      </p:pic>
+    </p:spTree>
+  </p:cSld>
+  <p:clrMapOvr>
+    <a:masterClrMapping/>
+  </p:clrMapOvr>
+  <p:timing>
+    <p:tnLst>
+      <p:par>
+        <p:cTn id="1" dur="indefinite" restart="never" nodeType="tmRoot"/>
+      </p:par>
+    </p:tnLst>
+  </p:timing>
+</p:sld>
+</file>
+
+<file path=ppt/slides/slide12.xml><?xml version="1.0" encoding="utf-8"?>
+<p:sld xmlns:a="http://schemas.openxmlformats.org/drawingml/2006/main" xmlns:r="http://schemas.openxmlformats.org/officeDocument/2006/relationships" xmlns:p="http://schemas.openxmlformats.org/presentationml/2006/main">
+  <p:cSld>
+    <p:spTree>
+      <p:nvGrpSpPr>
+        <p:cNvPr id="1" name=""/>
+        <p:cNvGrpSpPr/>
+        <p:nvPr/>
+      </p:nvGrpSpPr>
+      <p:grpSpPr>
+        <a:xfrm>
+          <a:off x="0" y="0"/>
+          <a:ext cx="0" cy="0"/>
+          <a:chOff x="0" y="0"/>
+          <a:chExt cx="0" cy="0"/>
+        </a:xfrm>
+      </p:grpSpPr>
+      <p:sp>
+        <p:nvSpPr>
+          <p:cNvPr id="2" name="Título 1"/>
+          <p:cNvSpPr>
+            <a:spLocks noGrp="1"/>
+          </p:cNvSpPr>
+          <p:nvPr>
+            <p:ph type="title"/>
+          </p:nvPr>
+        </p:nvSpPr>
+        <p:spPr/>
+        <p:txBody>
+          <a:bodyPr/>
+          <a:lstStyle/>
+          <a:p>
+            <a:r>
+              <a:rPr lang="pt-BR" dirty="0" smtClean="0"/>
+              <a:t>Desenvolvimento</a:t>
+            </a:r>
+            <a:endParaRPr lang="pt-BR" dirty="0"/>
+          </a:p>
+        </p:txBody>
+      </p:sp>
+      <p:sp>
+        <p:nvSpPr>
+          <p:cNvPr id="3" name="Espaço Reservado para Conteúdo 2"/>
+          <p:cNvSpPr>
+            <a:spLocks noGrp="1"/>
+          </p:cNvSpPr>
+          <p:nvPr>
+            <p:ph idx="1"/>
+          </p:nvPr>
+        </p:nvSpPr>
+        <p:spPr>
+          <a:xfrm>
+            <a:off x="1435608" y="1447800"/>
+            <a:ext cx="3064954" cy="552440"/>
+          </a:xfrm>
+        </p:spPr>
+        <p:txBody>
+          <a:bodyPr>
+            <a:normAutofit lnSpcReduction="10000"/>
+          </a:bodyPr>
+          <a:lstStyle/>
+          <a:p>
+            <a:r>
+              <a:rPr lang="pt-BR" dirty="0" smtClean="0"/>
+              <a:t>Especificação</a:t>
+            </a:r>
+            <a:endParaRPr lang="pt-BR" dirty="0"/>
+          </a:p>
+        </p:txBody>
+      </p:sp>
+      <p:pic>
+        <p:nvPicPr>
+          <p:cNvPr id="2053" name="Picture 5" descr="SynthElement"/>
+          <p:cNvPicPr>
+            <a:picLocks noChangeAspect="1" noChangeArrowheads="1"/>
+          </p:cNvPicPr>
+          <p:nvPr/>
+        </p:nvPicPr>
+        <p:blipFill>
+          <a:blip r:embed="rId2"/>
+          <a:srcRect/>
+          <a:stretch>
+            <a:fillRect/>
+          </a:stretch>
+        </p:blipFill>
+        <p:spPr bwMode="auto">
+          <a:xfrm>
+            <a:off x="1785918" y="2071678"/>
+            <a:ext cx="6467480" cy="4638668"/>
+          </a:xfrm>
+          <a:prstGeom prst="rect">
+            <a:avLst/>
+          </a:prstGeom>
+          <a:noFill/>
+          <a:ln w="9525">
+            <a:noFill/>
+            <a:miter lim="800000"/>
+            <a:headEnd/>
+            <a:tailEnd/>
+          </a:ln>
+        </p:spPr>
+      </p:pic>
+    </p:spTree>
+  </p:cSld>
+  <p:clrMapOvr>
+    <a:masterClrMapping/>
+  </p:clrMapOvr>
+  <p:timing>
+    <p:tnLst>
+      <p:par>
+        <p:cTn id="1" dur="indefinite" restart="never" nodeType="tmRoot"/>
+      </p:par>
+    </p:tnLst>
+  </p:timing>
+</p:sld>
+</file>
+
+<file path=ppt/slides/slide13.xml><?xml version="1.0" encoding="utf-8"?>
+<p:sld xmlns:a="http://schemas.openxmlformats.org/drawingml/2006/main" xmlns:r="http://schemas.openxmlformats.org/officeDocument/2006/relationships" xmlns:p="http://schemas.openxmlformats.org/presentationml/2006/main">
+  <p:cSld>
+    <p:spTree>
+      <p:nvGrpSpPr>
+        <p:cNvPr id="1" name=""/>
+        <p:cNvGrpSpPr/>
+        <p:nvPr/>
+      </p:nvGrpSpPr>
+      <p:grpSpPr>
+        <a:xfrm>
+          <a:off x="0" y="0"/>
+          <a:ext cx="0" cy="0"/>
+          <a:chOff x="0" y="0"/>
+          <a:chExt cx="0" cy="0"/>
+        </a:xfrm>
+      </p:grpSpPr>
+      <p:sp>
+        <p:nvSpPr>
+          <p:cNvPr id="2" name="Título 1"/>
+          <p:cNvSpPr>
+            <a:spLocks noGrp="1"/>
+          </p:cNvSpPr>
+          <p:nvPr>
+            <p:ph type="title"/>
+          </p:nvPr>
+        </p:nvSpPr>
+        <p:spPr/>
+        <p:txBody>
+          <a:bodyPr/>
+          <a:lstStyle/>
+          <a:p>
+            <a:r>
+              <a:rPr lang="pt-BR" dirty="0" smtClean="0"/>
+              <a:t>Desenvolvimento</a:t>
+            </a:r>
+            <a:endParaRPr lang="pt-BR" dirty="0"/>
+          </a:p>
+        </p:txBody>
+      </p:sp>
+      <p:sp>
+        <p:nvSpPr>
+          <p:cNvPr id="3" name="Espaço Reservado para Conteúdo 2"/>
+          <p:cNvSpPr>
+            <a:spLocks noGrp="1"/>
+          </p:cNvSpPr>
+          <p:nvPr>
+            <p:ph idx="1"/>
+          </p:nvPr>
+        </p:nvSpPr>
+        <p:spPr>
+          <a:xfrm>
+            <a:off x="1435608" y="1447800"/>
+            <a:ext cx="3136392" cy="552440"/>
+          </a:xfrm>
+        </p:spPr>
+        <p:txBody>
+          <a:bodyPr>
+            <a:normAutofit lnSpcReduction="10000"/>
+          </a:bodyPr>
+          <a:lstStyle/>
+          <a:p>
+            <a:r>
+              <a:rPr lang="pt-BR" dirty="0" smtClean="0"/>
+              <a:t>Especificação</a:t>
+            </a:r>
+            <a:endParaRPr lang="pt-BR" dirty="0"/>
+          </a:p>
+        </p:txBody>
+      </p:sp>
+      <p:pic>
+        <p:nvPicPr>
+          <p:cNvPr id="3075" name="Picture 3" descr="Tangram_Pool-Dispatcher"/>
+          <p:cNvPicPr>
+            <a:picLocks noChangeAspect="1" noChangeArrowheads="1"/>
+          </p:cNvPicPr>
+          <p:nvPr/>
+        </p:nvPicPr>
+        <p:blipFill>
+          <a:blip r:embed="rId2"/>
+          <a:srcRect/>
+          <a:stretch>
+            <a:fillRect/>
+          </a:stretch>
+        </p:blipFill>
+        <p:spPr bwMode="auto">
+          <a:xfrm>
+            <a:off x="2428860" y="2357430"/>
+            <a:ext cx="5753100" cy="3600450"/>
+          </a:xfrm>
+          <a:prstGeom prst="rect">
+            <a:avLst/>
+          </a:prstGeom>
+          <a:noFill/>
+          <a:ln w="9525">
+            <a:noFill/>
+            <a:miter lim="800000"/>
+            <a:headEnd/>
+            <a:tailEnd/>
+          </a:ln>
+        </p:spPr>
+      </p:pic>
+    </p:spTree>
+  </p:cSld>
+  <p:clrMapOvr>
+    <a:masterClrMapping/>
+  </p:clrMapOvr>
+</p:sld>
+</file>
+
+<file path=ppt/slides/slide14.xml><?xml version="1.0" encoding="utf-8"?>
+<p:sld xmlns:a="http://schemas.openxmlformats.org/drawingml/2006/main" xmlns:r="http://schemas.openxmlformats.org/officeDocument/2006/relationships" xmlns:p="http://schemas.openxmlformats.org/presentationml/2006/main">
+  <p:cSld>
+    <p:spTree>
+      <p:nvGrpSpPr>
+        <p:cNvPr id="1" name=""/>
+        <p:cNvGrpSpPr/>
+        <p:nvPr/>
+      </p:nvGrpSpPr>
+      <p:grpSpPr>
+        <a:xfrm>
+          <a:off x="0" y="0"/>
+          <a:ext cx="0" cy="0"/>
+          <a:chOff x="0" y="0"/>
+          <a:chExt cx="0" cy="0"/>
+        </a:xfrm>
+      </p:grpSpPr>
+      <p:sp>
+        <p:nvSpPr>
+          <p:cNvPr id="2" name="Título 1"/>
+          <p:cNvSpPr>
+            <a:spLocks noGrp="1"/>
+          </p:cNvSpPr>
+          <p:nvPr>
+            <p:ph type="title"/>
+          </p:nvPr>
+        </p:nvSpPr>
+        <p:spPr/>
+        <p:txBody>
+          <a:bodyPr/>
+          <a:lstStyle/>
+          <a:p>
+            <a:r>
+              <a:rPr lang="pt-BR" dirty="0" smtClean="0"/>
+              <a:t>Implementação</a:t>
+            </a:r>
+            <a:endParaRPr lang="pt-BR" dirty="0"/>
+          </a:p>
+        </p:txBody>
+      </p:sp>
+      <p:sp>
+        <p:nvSpPr>
+          <p:cNvPr id="3" name="Espaço Reservado para Conteúdo 2"/>
+          <p:cNvSpPr>
+            <a:spLocks noGrp="1"/>
+          </p:cNvSpPr>
+          <p:nvPr>
+            <p:ph idx="1"/>
+          </p:nvPr>
+        </p:nvSpPr>
+        <p:spPr/>
+        <p:txBody>
+          <a:bodyPr/>
+          <a:lstStyle/>
+          <a:p>
+            <a:endParaRPr lang="pt-BR" dirty="0"/>
+          </a:p>
+        </p:txBody>
+      </p:sp>
+    </p:spTree>
+  </p:cSld>
+  <p:clrMapOvr>
+    <a:masterClrMapping/>
+  </p:clrMapOvr>
+  <p:timing>
+    <p:tnLst>
+      <p:par>
+        <p:cTn id="1" dur="indefinite" restart="never" nodeType="tmRoot"/>
+      </p:par>
+    </p:tnLst>
+  </p:timing>
+</p:sld>
+</file>
+
+<file path=ppt/slides/slide15.xml><?xml version="1.0" encoding="utf-8"?>
+<p:sld xmlns:a="http://schemas.openxmlformats.org/drawingml/2006/main" xmlns:r="http://schemas.openxmlformats.org/officeDocument/2006/relationships" xmlns:p="http://schemas.openxmlformats.org/presentationml/2006/main">
+  <p:cSld>
+    <p:spTree>
+      <p:nvGrpSpPr>
+        <p:cNvPr id="1" name=""/>
+        <p:cNvGrpSpPr/>
+        <p:nvPr/>
+      </p:nvGrpSpPr>
+      <p:grpSpPr>
+        <a:xfrm>
+          <a:off x="0" y="0"/>
+          <a:ext cx="0" cy="0"/>
+          <a:chOff x="0" y="0"/>
+          <a:chExt cx="0" cy="0"/>
+        </a:xfrm>
+      </p:grpSpPr>
+      <p:sp>
+        <p:nvSpPr>
+          <p:cNvPr id="2" name="Título 1"/>
+          <p:cNvSpPr>
+            <a:spLocks noGrp="1"/>
+          </p:cNvSpPr>
+          <p:nvPr>
+            <p:ph type="title"/>
+          </p:nvPr>
+        </p:nvSpPr>
+        <p:spPr/>
+        <p:txBody>
+          <a:bodyPr/>
+          <a:lstStyle/>
+          <a:p>
+            <a:r>
+              <a:rPr lang="pt-BR" dirty="0" smtClean="0"/>
+              <a:t>Conclusão</a:t>
+            </a:r>
+            <a:endParaRPr lang="pt-BR" dirty="0"/>
+          </a:p>
+        </p:txBody>
+      </p:sp>
+      <p:sp>
+        <p:nvSpPr>
+          <p:cNvPr id="3" name="Espaço Reservado para Conteúdo 2"/>
+          <p:cNvSpPr>
+            <a:spLocks noGrp="1"/>
+          </p:cNvSpPr>
+          <p:nvPr>
+            <p:ph idx="1"/>
+          </p:nvPr>
+        </p:nvSpPr>
+        <p:spPr/>
+        <p:txBody>
+          <a:bodyPr/>
+          <a:lstStyle/>
+          <a:p>
+            <a:r>
+              <a:rPr lang="pt-BR" dirty="0" smtClean="0"/>
+              <a:t>Possui limitação de variação de fonemas</a:t>
+            </a:r>
+          </a:p>
+          <a:p>
+            <a:r>
+              <a:rPr lang="pt-BR" dirty="0" smtClean="0"/>
+              <a:t>Comandos disponibilizados permitem sincronização entre falas e das falas </a:t>
+            </a:r>
+            <a:r>
+              <a:rPr lang="pt-BR" smtClean="0"/>
+              <a:t>com animação</a:t>
+            </a:r>
+            <a:endParaRPr lang="pt-BR" dirty="0" smtClean="0"/>
+          </a:p>
+        </p:txBody>
+      </p:sp>
+    </p:spTree>
+  </p:cSld>
+  <p:clrMapOvr>
+    <a:masterClrMapping/>
+  </p:clrMapOvr>
+  <p:timing>
+    <p:tnLst>
+      <p:par>
+        <p:cTn id="1" dur="indefinite" restart="never" nodeType="tmRoot"/>
+      </p:par>
+    </p:tnLst>
+  </p:timing>
 </p:sld>
 </file>
 
@@ -4362,6 +5319,13 @@
   <p:clrMapOvr>
     <a:masterClrMapping/>
   </p:clrMapOvr>
+  <p:timing>
+    <p:tnLst>
+      <p:par>
+        <p:cTn id="1" dur="indefinite" restart="never" nodeType="tmRoot"/>
+      </p:par>
+    </p:tnLst>
+  </p:timing>
 </p:sld>
 </file>
 
@@ -4436,6 +5400,13 @@
             <a:pPr lvl="1"/>
             <a:r>
               <a:rPr lang="pt-BR" dirty="0" smtClean="0"/>
+              <a:t>Interpretar o programa, sintetizando o texto através da fala, conforme especificado</a:t>
+            </a:r>
+          </a:p>
+          <a:p>
+            <a:pPr lvl="1"/>
+            <a:r>
+              <a:rPr lang="pt-BR" dirty="0" smtClean="0"/>
               <a:t>Sincronizar a  fala com a animação feita no LTD</a:t>
             </a:r>
             <a:endParaRPr lang="pt-BR" dirty="0"/>
@@ -4447,6 +5418,13 @@
   <p:clrMapOvr>
     <a:masterClrMapping/>
   </p:clrMapOvr>
+  <p:timing>
+    <p:tnLst>
+      <p:par>
+        <p:cTn id="1" dur="indefinite" restart="never" nodeType="tmRoot"/>
+      </p:par>
+    </p:tnLst>
+  </p:timing>
 </p:sld>
 </file>
 
@@ -4502,30 +5480,40 @@
         </p:nvSpPr>
         <p:spPr/>
         <p:txBody>
-          <a:bodyPr/>
+          <a:bodyPr>
+            <a:normAutofit/>
+          </a:bodyPr>
           <a:lstStyle/>
           <a:p>
             <a:r>
+              <a:rPr lang="pt-BR" sz="3600" dirty="0" smtClean="0"/>
+              <a:t>Ambiente LTD</a:t>
+            </a:r>
+          </a:p>
+          <a:p>
+            <a:pPr lvl="1"/>
+            <a:r>
               <a:rPr lang="pt-BR" dirty="0" smtClean="0"/>
-              <a:t>Ambiente LTD</a:t>
-            </a:r>
-          </a:p>
-          <a:p>
+              <a:t>Editores visual e textual</a:t>
+            </a:r>
+          </a:p>
+          <a:p>
+            <a:r>
+              <a:rPr lang="pt-BR" sz="3600" dirty="0" smtClean="0"/>
+              <a:t>Linguagem do LTD</a:t>
+            </a:r>
+          </a:p>
+          <a:p>
+            <a:pPr lvl="1"/>
             <a:r>
               <a:rPr lang="pt-BR" dirty="0" smtClean="0"/>
-              <a:t>Linguagem do LTD</a:t>
-            </a:r>
-          </a:p>
-          <a:p>
-            <a:r>
-              <a:rPr lang="pt-BR" dirty="0" smtClean="0"/>
+              <a:t>Animação de modelos</a:t>
+            </a:r>
+          </a:p>
+          <a:p>
+            <a:r>
+              <a:rPr lang="pt-BR" sz="3600" dirty="0" smtClean="0"/>
               <a:t>Comandos de fala</a:t>
-            </a:r>
-          </a:p>
-          <a:p>
-            <a:r>
-              <a:rPr lang="pt-BR" dirty="0" smtClean="0"/>
-              <a:t>Síntese de voz</a:t>
             </a:r>
           </a:p>
         </p:txBody>
@@ -4535,6 +5523,13 @@
   <p:clrMapOvr>
     <a:masterClrMapping/>
   </p:clrMapOvr>
+  <p:timing>
+    <p:tnLst>
+      <p:par>
+        <p:cTn id="1" dur="indefinite" restart="never" nodeType="tmRoot"/>
+      </p:par>
+    </p:tnLst>
+  </p:timing>
 </p:sld>
 </file>
 
@@ -4572,7 +5567,7 @@
           <a:p>
             <a:r>
               <a:rPr lang="pt-BR" dirty="0" smtClean="0"/>
-              <a:t>Desenvolvimento</a:t>
+              <a:t>Fundamentação Teórica</a:t>
             </a:r>
             <a:endParaRPr lang="pt-BR" dirty="0"/>
           </a:p>
@@ -4590,9 +5585,46 @@
         </p:nvSpPr>
         <p:spPr/>
         <p:txBody>
-          <a:bodyPr/>
+          <a:bodyPr>
+            <a:normAutofit/>
+          </a:bodyPr>
           <a:lstStyle/>
           <a:p>
+            <a:r>
+              <a:rPr lang="pt-BR" sz="3600" dirty="0" smtClean="0"/>
+              <a:t>Síntese de Voz</a:t>
+            </a:r>
+            <a:endParaRPr lang="pt-BR" dirty="0" smtClean="0"/>
+          </a:p>
+          <a:p>
+            <a:r>
+              <a:rPr lang="pt-BR" sz="3600" dirty="0" smtClean="0"/>
+              <a:t>MBROLA</a:t>
+            </a:r>
+          </a:p>
+          <a:p>
+            <a:pPr lvl="1"/>
+            <a:r>
+              <a:rPr lang="pt-BR" dirty="0" smtClean="0"/>
+              <a:t>Sintetizador analógico</a:t>
+            </a:r>
+          </a:p>
+          <a:p>
+            <a:r>
+              <a:rPr lang="pt-BR" sz="3600" dirty="0" smtClean="0"/>
+              <a:t>JSML </a:t>
+            </a:r>
+            <a:r>
+              <a:rPr lang="pt-BR" sz="2800" dirty="0" smtClean="0"/>
+              <a:t>(Java Speech Markup Language)</a:t>
+            </a:r>
+          </a:p>
+          <a:p>
+            <a:pPr lvl="1"/>
+            <a:r>
+              <a:rPr lang="pt-BR" dirty="0" smtClean="0"/>
+              <a:t>Informações adicionais ao sintetizador</a:t>
+            </a:r>
             <a:endParaRPr lang="pt-BR" dirty="0"/>
           </a:p>
         </p:txBody>
@@ -4602,6 +5634,13 @@
   <p:clrMapOvr>
     <a:masterClrMapping/>
   </p:clrMapOvr>
+  <p:timing>
+    <p:tnLst>
+      <p:par>
+        <p:cTn id="1" dur="indefinite" restart="never" nodeType="tmRoot"/>
+      </p:par>
+    </p:tnLst>
+  </p:timing>
 </p:sld>
 </file>
 
@@ -4639,7 +5678,7 @@
           <a:p>
             <a:r>
               <a:rPr lang="pt-BR" dirty="0" smtClean="0"/>
-              <a:t>Implementação</a:t>
+              <a:t>Fundamentação Teórica</a:t>
             </a:r>
             <a:endParaRPr lang="pt-BR" dirty="0"/>
           </a:p>
@@ -4660,7 +5699,51 @@
           <a:bodyPr/>
           <a:lstStyle/>
           <a:p>
-            <a:endParaRPr lang="pt-BR" dirty="0"/>
+            <a:r>
+              <a:rPr lang="pt-BR" dirty="0" smtClean="0"/>
+              <a:t>Copa do Mundo</a:t>
+            </a:r>
+          </a:p>
+          <a:p>
+            <a:r>
+              <a:rPr lang="pt-BR" dirty="0" smtClean="0"/>
+              <a:t>1.152</a:t>
+            </a:r>
+          </a:p>
+          <a:p>
+            <a:r>
+              <a:rPr lang="pt-BR" dirty="0" smtClean="0"/>
+              <a:t>FURB</a:t>
+            </a:r>
+          </a:p>
+          <a:p>
+            <a:r>
+              <a:rPr lang="pt-BR" dirty="0" smtClean="0"/>
+              <a:t>CNPJ</a:t>
+            </a:r>
+          </a:p>
+          <a:p>
+            <a:r>
+              <a:rPr lang="pt-BR" dirty="0" smtClean="0"/>
+              <a:t>R$ 525,66</a:t>
+            </a:r>
+          </a:p>
+          <a:p>
+            <a:r>
+              <a:rPr lang="pt-BR" dirty="0" smtClean="0"/>
+              <a:t>11/05/85</a:t>
+            </a:r>
+          </a:p>
+          <a:p>
+            <a:r>
+              <a:rPr lang="pt-BR" dirty="0" smtClean="0"/>
+              <a:t>R. Antônio da Veiga, </a:t>
+            </a:r>
+            <a:r>
+              <a:rPr lang="pt-BR" smtClean="0"/>
+              <a:t>nº 140</a:t>
+            </a:r>
+            <a:endParaRPr lang="pt-BR" dirty="0" smtClean="0"/>
           </a:p>
         </p:txBody>
       </p:sp>
@@ -4669,6 +5752,13 @@
   <p:clrMapOvr>
     <a:masterClrMapping/>
   </p:clrMapOvr>
+  <p:timing>
+    <p:tnLst>
+      <p:par>
+        <p:cTn id="1" dur="indefinite" restart="never" nodeType="tmRoot"/>
+      </p:par>
+    </p:tnLst>
+  </p:timing>
 </p:sld>
 </file>
 
@@ -4706,7 +5796,7 @@
           <a:p>
             <a:r>
               <a:rPr lang="pt-BR" dirty="0" smtClean="0"/>
-              <a:t>Conclusão</a:t>
+              <a:t>Desenvolvimento</a:t>
             </a:r>
             <a:endParaRPr lang="pt-BR" dirty="0"/>
           </a:p>
@@ -4727,7 +5817,17 @@
           <a:bodyPr/>
           <a:lstStyle/>
           <a:p>
-            <a:endParaRPr lang="pt-BR"/>
+            <a:r>
+              <a:rPr lang="pt-BR" dirty="0" smtClean="0"/>
+              <a:t>Requisitos</a:t>
+            </a:r>
+          </a:p>
+          <a:p>
+            <a:r>
+              <a:rPr lang="pt-BR" dirty="0" smtClean="0"/>
+              <a:t>Especificação</a:t>
+            </a:r>
+            <a:endParaRPr lang="pt-BR" dirty="0"/>
           </a:p>
         </p:txBody>
       </p:sp>
@@ -4736,6 +5836,215 @@
   <p:clrMapOvr>
     <a:masterClrMapping/>
   </p:clrMapOvr>
+  <p:timing>
+    <p:tnLst>
+      <p:par>
+        <p:cTn id="1" dur="indefinite" restart="never" nodeType="tmRoot"/>
+      </p:par>
+    </p:tnLst>
+  </p:timing>
+</p:sld>
+</file>
+
+<file path=ppt/slides/slide8.xml><?xml version="1.0" encoding="utf-8"?>
+<p:sld xmlns:a="http://schemas.openxmlformats.org/drawingml/2006/main" xmlns:r="http://schemas.openxmlformats.org/officeDocument/2006/relationships" xmlns:p="http://schemas.openxmlformats.org/presentationml/2006/main">
+  <p:cSld>
+    <p:spTree>
+      <p:nvGrpSpPr>
+        <p:cNvPr id="1" name=""/>
+        <p:cNvGrpSpPr/>
+        <p:nvPr/>
+      </p:nvGrpSpPr>
+      <p:grpSpPr>
+        <a:xfrm>
+          <a:off x="0" y="0"/>
+          <a:ext cx="0" cy="0"/>
+          <a:chOff x="0" y="0"/>
+          <a:chExt cx="0" cy="0"/>
+        </a:xfrm>
+      </p:grpSpPr>
+      <p:sp>
+        <p:nvSpPr>
+          <p:cNvPr id="2" name="Título 1"/>
+          <p:cNvSpPr>
+            <a:spLocks noGrp="1"/>
+          </p:cNvSpPr>
+          <p:nvPr>
+            <p:ph type="title"/>
+          </p:nvPr>
+        </p:nvSpPr>
+        <p:spPr/>
+        <p:txBody>
+          <a:bodyPr/>
+          <a:lstStyle/>
+          <a:p>
+            <a:r>
+              <a:rPr lang="pt-BR" dirty="0" smtClean="0"/>
+              <a:t>Desenvolvimento</a:t>
+            </a:r>
+            <a:endParaRPr lang="pt-BR" dirty="0"/>
+          </a:p>
+        </p:txBody>
+      </p:sp>
+      <p:sp>
+        <p:nvSpPr>
+          <p:cNvPr id="3" name="Espaço Reservado para Conteúdo 2"/>
+          <p:cNvSpPr>
+            <a:spLocks noGrp="1"/>
+          </p:cNvSpPr>
+          <p:nvPr>
+            <p:ph idx="1"/>
+          </p:nvPr>
+        </p:nvSpPr>
+        <p:spPr/>
+        <p:txBody>
+          <a:bodyPr/>
+          <a:lstStyle/>
+          <a:p>
+            <a:r>
+              <a:rPr lang="pt-BR" dirty="0" smtClean="0"/>
+              <a:t>Requisitos</a:t>
+            </a:r>
+          </a:p>
+          <a:p>
+            <a:pPr lvl="1"/>
+            <a:r>
+              <a:rPr lang="pt-BR" dirty="0" smtClean="0"/>
+              <a:t>A BNF deve suportar comandos para especificar a fala</a:t>
+            </a:r>
+          </a:p>
+          <a:p>
+            <a:pPr lvl="1"/>
+            <a:r>
+              <a:rPr lang="pt-BR" dirty="0" smtClean="0"/>
+              <a:t>Gerar uma definição textual do texto que será repassado ao sintetizador</a:t>
+            </a:r>
+          </a:p>
+          <a:p>
+            <a:pPr lvl="1"/>
+            <a:r>
+              <a:rPr lang="pt-BR" dirty="0" smtClean="0"/>
+              <a:t>Permitir a um usuário ou um sistema externo atribuir uma entrada no formato JSML ao sintetizador</a:t>
+            </a:r>
+            <a:endParaRPr lang="pt-BR" dirty="0"/>
+          </a:p>
+        </p:txBody>
+      </p:sp>
+    </p:spTree>
+  </p:cSld>
+  <p:clrMapOvr>
+    <a:masterClrMapping/>
+  </p:clrMapOvr>
+  <p:timing>
+    <p:tnLst>
+      <p:par>
+        <p:cTn id="1" dur="indefinite" restart="never" nodeType="tmRoot"/>
+      </p:par>
+    </p:tnLst>
+  </p:timing>
+</p:sld>
+</file>
+
+<file path=ppt/slides/slide9.xml><?xml version="1.0" encoding="utf-8"?>
+<p:sld xmlns:a="http://schemas.openxmlformats.org/drawingml/2006/main" xmlns:r="http://schemas.openxmlformats.org/officeDocument/2006/relationships" xmlns:p="http://schemas.openxmlformats.org/presentationml/2006/main">
+  <p:cSld>
+    <p:spTree>
+      <p:nvGrpSpPr>
+        <p:cNvPr id="1" name=""/>
+        <p:cNvGrpSpPr/>
+        <p:nvPr/>
+      </p:nvGrpSpPr>
+      <p:grpSpPr>
+        <a:xfrm>
+          <a:off x="0" y="0"/>
+          <a:ext cx="0" cy="0"/>
+          <a:chOff x="0" y="0"/>
+          <a:chExt cx="0" cy="0"/>
+        </a:xfrm>
+      </p:grpSpPr>
+      <p:sp>
+        <p:nvSpPr>
+          <p:cNvPr id="2" name="Título 1"/>
+          <p:cNvSpPr>
+            <a:spLocks noGrp="1"/>
+          </p:cNvSpPr>
+          <p:nvPr>
+            <p:ph type="title"/>
+          </p:nvPr>
+        </p:nvSpPr>
+        <p:spPr/>
+        <p:txBody>
+          <a:bodyPr/>
+          <a:lstStyle/>
+          <a:p>
+            <a:r>
+              <a:rPr lang="pt-BR" dirty="0" smtClean="0"/>
+              <a:t>Desenvolvimento</a:t>
+            </a:r>
+            <a:endParaRPr lang="pt-BR" dirty="0"/>
+          </a:p>
+        </p:txBody>
+      </p:sp>
+      <p:sp>
+        <p:nvSpPr>
+          <p:cNvPr id="3" name="Espaço Reservado para Conteúdo 2"/>
+          <p:cNvSpPr>
+            <a:spLocks noGrp="1"/>
+          </p:cNvSpPr>
+          <p:nvPr>
+            <p:ph idx="1"/>
+          </p:nvPr>
+        </p:nvSpPr>
+        <p:spPr/>
+        <p:txBody>
+          <a:bodyPr/>
+          <a:lstStyle/>
+          <a:p>
+            <a:r>
+              <a:rPr lang="pt-BR" dirty="0" smtClean="0"/>
+              <a:t>Especificação dos comandos para suportar a fala</a:t>
+            </a:r>
+          </a:p>
+          <a:p>
+            <a:pPr lvl="1"/>
+            <a:r>
+              <a:rPr lang="pt-BR" dirty="0" smtClean="0"/>
+              <a:t>fala (sobreposta ou exclusiva)</a:t>
+            </a:r>
+          </a:p>
+          <a:p>
+            <a:pPr lvl="1"/>
+            <a:r>
+              <a:rPr lang="pt-BR" dirty="0" smtClean="0"/>
+              <a:t>e</a:t>
+            </a:r>
+            <a:r>
+              <a:rPr lang="pt-BR" dirty="0" smtClean="0"/>
+              <a:t>nquanto fala &lt;bloco de comandos&gt;</a:t>
+            </a:r>
+          </a:p>
+          <a:p>
+            <a:pPr lvl="1"/>
+            <a:r>
+              <a:rPr lang="pt-BR" dirty="0" smtClean="0"/>
+              <a:t>espera fala</a:t>
+            </a:r>
+            <a:endParaRPr lang="pt-BR" dirty="0" smtClean="0"/>
+          </a:p>
+        </p:txBody>
+      </p:sp>
+    </p:spTree>
+  </p:cSld>
+  <p:clrMapOvr>
+    <a:masterClrMapping/>
+  </p:clrMapOvr>
+  <p:timing>
+    <p:tnLst>
+      <p:par>
+        <p:cTn id="1" dur="indefinite" restart="never" nodeType="tmRoot"/>
+      </p:par>
+    </p:tnLst>
+  </p:timing>
 </p:sld>
 </file>
 

</xml_diff>